<commit_message>
Инструкции: P8PDataGrid - группы в заголовке, группы в строках, containerComponent, containerComponentProps, fixedHeader, fixedColumns, columnWidth
</commit_message>
<xml_diff>
--- a/docs/Image Sources.pptx
+++ b/docs/Image Sources.pptx
@@ -251,7 +251,7 @@
           <a:p>
             <a:fld id="{0E95A78A-B763-441B-A874-EAEEC6ED6B8F}" type="datetimeFigureOut">
               <a:rPr lang="ru-RU" smtClean="0"/>
-              <a:t>11.12.2023</a:t>
+              <a:t>23.05.2024</a:t>
             </a:fld>
             <a:endParaRPr lang="ru-RU"/>
           </a:p>
@@ -421,7 +421,7 @@
           <a:p>
             <a:fld id="{0E95A78A-B763-441B-A874-EAEEC6ED6B8F}" type="datetimeFigureOut">
               <a:rPr lang="ru-RU" smtClean="0"/>
-              <a:t>11.12.2023</a:t>
+              <a:t>23.05.2024</a:t>
             </a:fld>
             <a:endParaRPr lang="ru-RU"/>
           </a:p>
@@ -601,7 +601,7 @@
           <a:p>
             <a:fld id="{0E95A78A-B763-441B-A874-EAEEC6ED6B8F}" type="datetimeFigureOut">
               <a:rPr lang="ru-RU" smtClean="0"/>
-              <a:t>11.12.2023</a:t>
+              <a:t>23.05.2024</a:t>
             </a:fld>
             <a:endParaRPr lang="ru-RU"/>
           </a:p>
@@ -771,7 +771,7 @@
           <a:p>
             <a:fld id="{0E95A78A-B763-441B-A874-EAEEC6ED6B8F}" type="datetimeFigureOut">
               <a:rPr lang="ru-RU" smtClean="0"/>
-              <a:t>11.12.2023</a:t>
+              <a:t>23.05.2024</a:t>
             </a:fld>
             <a:endParaRPr lang="ru-RU"/>
           </a:p>
@@ -1017,7 +1017,7 @@
           <a:p>
             <a:fld id="{0E95A78A-B763-441B-A874-EAEEC6ED6B8F}" type="datetimeFigureOut">
               <a:rPr lang="ru-RU" smtClean="0"/>
-              <a:t>11.12.2023</a:t>
+              <a:t>23.05.2024</a:t>
             </a:fld>
             <a:endParaRPr lang="ru-RU"/>
           </a:p>
@@ -1249,7 +1249,7 @@
           <a:p>
             <a:fld id="{0E95A78A-B763-441B-A874-EAEEC6ED6B8F}" type="datetimeFigureOut">
               <a:rPr lang="ru-RU" smtClean="0"/>
-              <a:t>11.12.2023</a:t>
+              <a:t>23.05.2024</a:t>
             </a:fld>
             <a:endParaRPr lang="ru-RU"/>
           </a:p>
@@ -1616,7 +1616,7 @@
           <a:p>
             <a:fld id="{0E95A78A-B763-441B-A874-EAEEC6ED6B8F}" type="datetimeFigureOut">
               <a:rPr lang="ru-RU" smtClean="0"/>
-              <a:t>11.12.2023</a:t>
+              <a:t>23.05.2024</a:t>
             </a:fld>
             <a:endParaRPr lang="ru-RU"/>
           </a:p>
@@ -1734,7 +1734,7 @@
           <a:p>
             <a:fld id="{0E95A78A-B763-441B-A874-EAEEC6ED6B8F}" type="datetimeFigureOut">
               <a:rPr lang="ru-RU" smtClean="0"/>
-              <a:t>11.12.2023</a:t>
+              <a:t>23.05.2024</a:t>
             </a:fld>
             <a:endParaRPr lang="ru-RU"/>
           </a:p>
@@ -1829,7 +1829,7 @@
           <a:p>
             <a:fld id="{0E95A78A-B763-441B-A874-EAEEC6ED6B8F}" type="datetimeFigureOut">
               <a:rPr lang="ru-RU" smtClean="0"/>
-              <a:t>11.12.2023</a:t>
+              <a:t>23.05.2024</a:t>
             </a:fld>
             <a:endParaRPr lang="ru-RU"/>
           </a:p>
@@ -2106,7 +2106,7 @@
           <a:p>
             <a:fld id="{0E95A78A-B763-441B-A874-EAEEC6ED6B8F}" type="datetimeFigureOut">
               <a:rPr lang="ru-RU" smtClean="0"/>
-              <a:t>11.12.2023</a:t>
+              <a:t>23.05.2024</a:t>
             </a:fld>
             <a:endParaRPr lang="ru-RU"/>
           </a:p>
@@ -2359,7 +2359,7 @@
           <a:p>
             <a:fld id="{0E95A78A-B763-441B-A874-EAEEC6ED6B8F}" type="datetimeFigureOut">
               <a:rPr lang="ru-RU" smtClean="0"/>
-              <a:t>11.12.2023</a:t>
+              <a:t>23.05.2024</a:t>
             </a:fld>
             <a:endParaRPr lang="ru-RU"/>
           </a:p>
@@ -2572,7 +2572,7 @@
           <a:p>
             <a:fld id="{0E95A78A-B763-441B-A874-EAEEC6ED6B8F}" type="datetimeFigureOut">
               <a:rPr lang="ru-RU" smtClean="0"/>
-              <a:t>11.12.2023</a:t>
+              <a:t>23.05.2024</a:t>
             </a:fld>
             <a:endParaRPr lang="ru-RU"/>
           </a:p>
@@ -5412,7 +5412,7 @@
       </p:grpSpPr>
       <p:pic>
         <p:nvPicPr>
-          <p:cNvPr id="5" name="Рисунок 4"/>
+          <p:cNvPr id="2" name="Рисунок 1"/>
           <p:cNvPicPr>
             <a:picLocks noChangeAspect="1"/>
           </p:cNvPicPr>
@@ -5426,8 +5426,8 @@
         </p:blipFill>
         <p:spPr>
           <a:xfrm>
-            <a:off x="983062" y="197957"/>
-            <a:ext cx="8235753" cy="6249437"/>
+            <a:off x="702720" y="207818"/>
+            <a:ext cx="6430677" cy="6249437"/>
           </a:xfrm>
           <a:prstGeom prst="rect">
             <a:avLst/>

</xml_diff>